<commit_message>
update factory method uml
</commit_message>
<xml_diff>
--- a/PPTs/OOP Class Relationships.pptx
+++ b/PPTs/OOP Class Relationships.pptx
@@ -141,6 +141,11 @@
       </a:defRPr>
     </a:lvl9pPr>
   </p:defaultTextStyle>
+  <p:extLst>
+    <p:ext uri="{EFAFB233-063F-42B5-8137-9DF3F51BA10A}">
+      <p15:sldGuideLst xmlns:p15="http://schemas.microsoft.com/office/powerpoint/2012/main"/>
+    </p:ext>
+  </p:extLst>
 </p:presentation>
 </file>
 
@@ -382,7 +387,7 @@
           <a:p>
             <a:fld id="{CF36DBEA-EEFF-4848-BB39-9496429C4B8B}" type="datetimeFigureOut">
               <a:rPr lang="en-PH" smtClean="0"/>
-              <a:t>23 Aug 2020</a:t>
+              <a:t>08/10/2024</a:t>
             </a:fld>
             <a:endParaRPr lang="en-PH"/>
           </a:p>
@@ -773,7 +778,7 @@
           <a:p>
             <a:fld id="{CF36DBEA-EEFF-4848-BB39-9496429C4B8B}" type="datetimeFigureOut">
               <a:rPr lang="en-PH" smtClean="0"/>
-              <a:t>23 Aug 2020</a:t>
+              <a:t>08/10/2024</a:t>
             </a:fld>
             <a:endParaRPr lang="en-PH"/>
           </a:p>
@@ -973,7 +978,7 @@
           <a:p>
             <a:fld id="{CF36DBEA-EEFF-4848-BB39-9496429C4B8B}" type="datetimeFigureOut">
               <a:rPr lang="en-PH" smtClean="0"/>
-              <a:t>23 Aug 2020</a:t>
+              <a:t>08/10/2024</a:t>
             </a:fld>
             <a:endParaRPr lang="en-PH"/>
           </a:p>
@@ -1183,7 +1188,7 @@
           <a:p>
             <a:fld id="{CF36DBEA-EEFF-4848-BB39-9496429C4B8B}" type="datetimeFigureOut">
               <a:rPr lang="en-PH" smtClean="0"/>
-              <a:t>23 Aug 2020</a:t>
+              <a:t>08/10/2024</a:t>
             </a:fld>
             <a:endParaRPr lang="en-PH"/>
           </a:p>
@@ -1405,7 +1410,7 @@
           <a:p>
             <a:fld id="{CF36DBEA-EEFF-4848-BB39-9496429C4B8B}" type="datetimeFigureOut">
               <a:rPr lang="en-PH" smtClean="0"/>
-              <a:t>23 Aug 2020</a:t>
+              <a:t>08/10/2024</a:t>
             </a:fld>
             <a:endParaRPr lang="en-PH"/>
           </a:p>
@@ -1870,7 +1875,7 @@
           <a:p>
             <a:fld id="{CF36DBEA-EEFF-4848-BB39-9496429C4B8B}" type="datetimeFigureOut">
               <a:rPr lang="en-PH" smtClean="0"/>
-              <a:t>23 Aug 2020</a:t>
+              <a:t>08/10/2024</a:t>
             </a:fld>
             <a:endParaRPr lang="en-PH"/>
           </a:p>
@@ -2265,7 +2270,7 @@
           <a:p>
             <a:fld id="{CF36DBEA-EEFF-4848-BB39-9496429C4B8B}" type="datetimeFigureOut">
               <a:rPr lang="en-PH" smtClean="0"/>
-              <a:t>23 Aug 2020</a:t>
+              <a:t>08/10/2024</a:t>
             </a:fld>
             <a:endParaRPr lang="en-PH"/>
           </a:p>
@@ -2601,7 +2606,7 @@
           <a:p>
             <a:fld id="{CF36DBEA-EEFF-4848-BB39-9496429C4B8B}" type="datetimeFigureOut">
               <a:rPr lang="en-PH" smtClean="0"/>
-              <a:t>23 Aug 2020</a:t>
+              <a:t>08/10/2024</a:t>
             </a:fld>
             <a:endParaRPr lang="en-PH"/>
           </a:p>
@@ -2869,7 +2874,7 @@
           <a:p>
             <a:fld id="{CF36DBEA-EEFF-4848-BB39-9496429C4B8B}" type="datetimeFigureOut">
               <a:rPr lang="en-PH" smtClean="0"/>
-              <a:t>23 Aug 2020</a:t>
+              <a:t>08/10/2024</a:t>
             </a:fld>
             <a:endParaRPr lang="en-PH"/>
           </a:p>
@@ -3284,7 +3289,7 @@
           <a:p>
             <a:fld id="{CF36DBEA-EEFF-4848-BB39-9496429C4B8B}" type="datetimeFigureOut">
               <a:rPr lang="en-PH" smtClean="0"/>
-              <a:t>23 Aug 2020</a:t>
+              <a:t>08/10/2024</a:t>
             </a:fld>
             <a:endParaRPr lang="en-PH"/>
           </a:p>
@@ -3426,7 +3431,7 @@
           <a:p>
             <a:fld id="{CF36DBEA-EEFF-4848-BB39-9496429C4B8B}" type="datetimeFigureOut">
               <a:rPr lang="en-PH" smtClean="0"/>
-              <a:t>23 Aug 2020</a:t>
+              <a:t>08/10/2024</a:t>
             </a:fld>
             <a:endParaRPr lang="en-PH"/>
           </a:p>
@@ -3539,7 +3544,7 @@
           <a:p>
             <a:fld id="{CF36DBEA-EEFF-4848-BB39-9496429C4B8B}" type="datetimeFigureOut">
               <a:rPr lang="en-PH" smtClean="0"/>
-              <a:t>23 Aug 2020</a:t>
+              <a:t>08/10/2024</a:t>
             </a:fld>
             <a:endParaRPr lang="en-PH"/>
           </a:p>
@@ -3852,7 +3857,7 @@
           <a:p>
             <a:fld id="{CF36DBEA-EEFF-4848-BB39-9496429C4B8B}" type="datetimeFigureOut">
               <a:rPr lang="en-PH" smtClean="0"/>
-              <a:t>23 Aug 2020</a:t>
+              <a:t>08/10/2024</a:t>
             </a:fld>
             <a:endParaRPr lang="en-PH"/>
           </a:p>
@@ -4098,7 +4103,7 @@
           <a:p>
             <a:fld id="{CF36DBEA-EEFF-4848-BB39-9496429C4B8B}" type="datetimeFigureOut">
               <a:rPr lang="en-PH" smtClean="0"/>
-              <a:t>23 Aug 2020</a:t>
+              <a:t>08/10/2024</a:t>
             </a:fld>
             <a:endParaRPr lang="en-PH"/>
           </a:p>
@@ -4807,7 +4812,15 @@
             </a:r>
             <a:r>
               <a:rPr lang="en-US" dirty="0"/>
-              <a:t>`, such as `Book` or `Newspaper` will be forced to implement the `borrow()` and `return()` methods</a:t>
+              <a:t>`, such as `Book` or </a:t>
+            </a:r>
+            <a:r>
+              <a:rPr lang="en-US"/>
+              <a:t>`Periodical` </a:t>
+            </a:r>
+            <a:r>
+              <a:rPr lang="en-US" dirty="0"/>
+              <a:t>will be forced to implement the `borrow()` and `return()` methods</a:t>
             </a:r>
             <a:endParaRPr lang="en-PH" dirty="0"/>
           </a:p>

</xml_diff>